<commit_message>
writting logic is fully done. Alhamdullila )
</commit_message>
<xml_diff>
--- a/example.pptx
+++ b/example.pptx
@@ -532,7 +532,7 @@
           <a:p>
             <a:fld id="{F73F0BFC-2C88-4AAF-B42F-33B416312C7A}" type="datetimeFigureOut">
               <a:rPr lang="en-US" smtClean="0"/>
-              <a:t>1/4/2024</a:t>
+              <a:t>1/6/2024</a:t>
             </a:fld>
             <a:endParaRPr lang="en-US"/>
           </a:p>
@@ -716,7 +716,7 @@
           <a:p>
             <a:fld id="{F73F0BFC-2C88-4AAF-B42F-33B416312C7A}" type="datetimeFigureOut">
               <a:rPr lang="en-US" smtClean="0"/>
-              <a:t>1/4/2024</a:t>
+              <a:t>1/6/2024</a:t>
             </a:fld>
             <a:endParaRPr lang="en-US"/>
           </a:p>
@@ -900,7 +900,7 @@
           <a:p>
             <a:fld id="{F73F0BFC-2C88-4AAF-B42F-33B416312C7A}" type="datetimeFigureOut">
               <a:rPr lang="en-US" smtClean="0"/>
-              <a:t>1/4/2024</a:t>
+              <a:t>1/6/2024</a:t>
             </a:fld>
             <a:endParaRPr lang="en-US"/>
           </a:p>
@@ -1070,7 +1070,7 @@
           <a:p>
             <a:fld id="{F73F0BFC-2C88-4AAF-B42F-33B416312C7A}" type="datetimeFigureOut">
               <a:rPr lang="en-US" smtClean="0"/>
-              <a:t>1/4/2024</a:t>
+              <a:t>1/6/2024</a:t>
             </a:fld>
             <a:endParaRPr lang="en-US"/>
           </a:p>
@@ -1395,7 +1395,7 @@
           <a:p>
             <a:fld id="{F73F0BFC-2C88-4AAF-B42F-33B416312C7A}" type="datetimeFigureOut">
               <a:rPr lang="en-US" smtClean="0"/>
-              <a:t>1/4/2024</a:t>
+              <a:t>1/6/2024</a:t>
             </a:fld>
             <a:endParaRPr lang="en-US"/>
           </a:p>
@@ -1793,7 +1793,7 @@
           <a:p>
             <a:fld id="{F73F0BFC-2C88-4AAF-B42F-33B416312C7A}" type="datetimeFigureOut">
               <a:rPr lang="en-US" smtClean="0"/>
-              <a:t>1/4/2024</a:t>
+              <a:t>1/6/2024</a:t>
             </a:fld>
             <a:endParaRPr lang="en-US"/>
           </a:p>
@@ -2227,7 +2227,7 @@
           <a:p>
             <a:fld id="{F73F0BFC-2C88-4AAF-B42F-33B416312C7A}" type="datetimeFigureOut">
               <a:rPr lang="en-US" smtClean="0"/>
-              <a:t>1/4/2024</a:t>
+              <a:t>1/6/2024</a:t>
             </a:fld>
             <a:endParaRPr lang="en-US"/>
           </a:p>
@@ -2355,7 +2355,7 @@
           <a:p>
             <a:fld id="{F73F0BFC-2C88-4AAF-B42F-33B416312C7A}" type="datetimeFigureOut">
               <a:rPr lang="en-US" smtClean="0"/>
-              <a:t>1/4/2024</a:t>
+              <a:t>1/6/2024</a:t>
             </a:fld>
             <a:endParaRPr lang="en-US"/>
           </a:p>
@@ -2460,7 +2460,7 @@
           <a:p>
             <a:fld id="{F73F0BFC-2C88-4AAF-B42F-33B416312C7A}" type="datetimeFigureOut">
               <a:rPr lang="en-US" smtClean="0"/>
-              <a:t>1/4/2024</a:t>
+              <a:t>1/6/2024</a:t>
             </a:fld>
             <a:endParaRPr lang="en-US"/>
           </a:p>
@@ -2901,7 +2901,7 @@
           <a:p>
             <a:fld id="{F73F0BFC-2C88-4AAF-B42F-33B416312C7A}" type="datetimeFigureOut">
               <a:rPr lang="en-US" smtClean="0"/>
-              <a:t>1/4/2024</a:t>
+              <a:t>1/6/2024</a:t>
             </a:fld>
             <a:endParaRPr lang="en-US"/>
           </a:p>
@@ -3328,7 +3328,7 @@
           <a:p>
             <a:fld id="{F73F0BFC-2C88-4AAF-B42F-33B416312C7A}" type="datetimeFigureOut">
               <a:rPr lang="en-US" smtClean="0"/>
-              <a:t>1/4/2024</a:t>
+              <a:t>1/6/2024</a:t>
             </a:fld>
             <a:endParaRPr lang="en-US"/>
           </a:p>
@@ -3613,7 +3613,7 @@
           <a:p>
             <a:fld id="{F73F0BFC-2C88-4AAF-B42F-33B416312C7A}" type="datetimeFigureOut">
               <a:rPr lang="en-US" smtClean="0"/>
-              <a:t>1/4/2024</a:t>
+              <a:t>1/6/2024</a:t>
             </a:fld>
             <a:endParaRPr lang="en-US"/>
           </a:p>
@@ -4210,7 +4210,7 @@
         </p:nvSpPr>
         <p:spPr bwMode="auto">
           <a:xfrm>
-            <a:off x="685800" y="2280424"/>
+            <a:off x="609600" y="2286000"/>
             <a:ext cx="7924800" cy="3510776"/>
           </a:xfrm>
           <a:prstGeom prst="rect">

</xml_diff>

<commit_message>
reading and writting logic is fully done with images and text. Just having problem with font size yet. )
</commit_message>
<xml_diff>
--- a/example.pptx
+++ b/example.pptx
@@ -7,11 +7,12 @@
   <p:sldIdLst>
     <p:sldId id="256" r:id="rId2"/>
     <p:sldId id="257" r:id="rId3"/>
+    <p:sldId id="258" r:id="rId4"/>
   </p:sldIdLst>
   <p:sldSz cx="9144000" cy="6858000" type="screen4x3"/>
   <p:notesSz cx="6858000" cy="9144000"/>
   <p:custDataLst>
-    <p:tags r:id="rId4"/>
+    <p:tags r:id="rId5"/>
   </p:custDataLst>
   <p:defaultTextStyle>
     <a:defPPr>
@@ -4488,6 +4489,136 @@
 </p:sld>
 </file>
 
+<file path=ppt/slides/slide3.xml><?xml version="1.0" encoding="utf-8"?>
+<p:sld xmlns:a="http://schemas.openxmlformats.org/drawingml/2006/main" xmlns:r="http://schemas.openxmlformats.org/officeDocument/2006/relationships" xmlns:p="http://schemas.openxmlformats.org/presentationml/2006/main">
+  <p:cSld>
+    <p:spTree>
+      <p:nvGrpSpPr>
+        <p:cNvPr id="1" name=""/>
+        <p:cNvGrpSpPr/>
+        <p:nvPr/>
+      </p:nvGrpSpPr>
+      <p:grpSpPr>
+        <a:xfrm>
+          <a:off x="0" y="0"/>
+          <a:ext cx="0" cy="0"/>
+          <a:chOff x="0" y="0"/>
+          <a:chExt cx="0" cy="0"/>
+        </a:xfrm>
+      </p:grpSpPr>
+      <p:sp>
+        <p:nvSpPr>
+          <p:cNvPr id="2" name="Заголовок 1">
+            <a:extLst>
+              <a:ext uri="{FF2B5EF4-FFF2-40B4-BE49-F238E27FC236}">
+                <a16:creationId xmlns:a16="http://schemas.microsoft.com/office/drawing/2014/main" id="{4B50F9CB-B67D-4548-A231-01D25D785CEF}"/>
+              </a:ext>
+            </a:extLst>
+          </p:cNvPr>
+          <p:cNvSpPr>
+            <a:spLocks noGrp="1"/>
+          </p:cNvSpPr>
+          <p:nvPr>
+            <p:ph type="title"/>
+          </p:nvPr>
+        </p:nvSpPr>
+        <p:spPr/>
+        <p:txBody>
+          <a:bodyPr/>
+          <a:lstStyle/>
+          <a:p>
+            <a:r>
+              <a:rPr lang="en-US" dirty="0"/>
+              <a:t>My IMAGE with code</a:t>
+            </a:r>
+          </a:p>
+        </p:txBody>
+      </p:sp>
+      <p:pic>
+        <p:nvPicPr>
+          <p:cNvPr id="4" name="Рисунок 3">
+            <a:extLst>
+              <a:ext uri="{FF2B5EF4-FFF2-40B4-BE49-F238E27FC236}">
+                <a16:creationId xmlns:a16="http://schemas.microsoft.com/office/drawing/2014/main" id="{BDACBAC2-C1B5-48A6-921C-E4ACD55B9D04}"/>
+              </a:ext>
+            </a:extLst>
+          </p:cNvPr>
+          <p:cNvPicPr>
+            <a:picLocks noChangeAspect="1"/>
+          </p:cNvPicPr>
+          <p:nvPr/>
+        </p:nvPicPr>
+        <p:blipFill>
+          <a:blip r:embed="rId2" cstate="print">
+            <a:extLst>
+              <a:ext uri="{28A0092B-C50C-407E-A947-70E740481C1C}">
+                <a14:useLocalDpi xmlns:a14="http://schemas.microsoft.com/office/drawing/2010/main" val="0"/>
+              </a:ext>
+            </a:extLst>
+          </a:blip>
+          <a:stretch>
+            <a:fillRect/>
+          </a:stretch>
+        </p:blipFill>
+        <p:spPr>
+          <a:xfrm>
+            <a:off x="5037798" y="1884407"/>
+            <a:ext cx="3072857" cy="4277600"/>
+          </a:xfrm>
+          <a:prstGeom prst="rect">
+            <a:avLst/>
+          </a:prstGeom>
+        </p:spPr>
+      </p:pic>
+      <p:pic>
+        <p:nvPicPr>
+          <p:cNvPr id="5" name="Рисунок 4">
+            <a:extLst>
+              <a:ext uri="{FF2B5EF4-FFF2-40B4-BE49-F238E27FC236}">
+                <a16:creationId xmlns:a16="http://schemas.microsoft.com/office/drawing/2014/main" id="{CB4DBD9C-DBEA-4218-9379-9629D1DF82A2}"/>
+              </a:ext>
+            </a:extLst>
+          </p:cNvPr>
+          <p:cNvPicPr>
+            <a:picLocks noChangeAspect="1"/>
+          </p:cNvPicPr>
+          <p:nvPr/>
+        </p:nvPicPr>
+        <p:blipFill>
+          <a:blip r:embed="rId2" cstate="print">
+            <a:extLst>
+              <a:ext uri="{28A0092B-C50C-407E-A947-70E740481C1C}">
+                <a14:useLocalDpi xmlns:a14="http://schemas.microsoft.com/office/drawing/2010/main" val="0"/>
+              </a:ext>
+            </a:extLst>
+          </a:blip>
+          <a:stretch>
+            <a:fillRect/>
+          </a:stretch>
+        </p:blipFill>
+        <p:spPr>
+          <a:xfrm>
+            <a:off x="1033345" y="1884407"/>
+            <a:ext cx="3072857" cy="4277600"/>
+          </a:xfrm>
+          <a:prstGeom prst="rect">
+            <a:avLst/>
+          </a:prstGeom>
+        </p:spPr>
+      </p:pic>
+    </p:spTree>
+    <p:extLst>
+      <p:ext uri="{BB962C8B-B14F-4D97-AF65-F5344CB8AC3E}">
+        <p14:creationId xmlns:p14="http://schemas.microsoft.com/office/powerpoint/2010/main" val="4117410959"/>
+      </p:ext>
+    </p:extLst>
+  </p:cSld>
+  <p:clrMapOvr>
+    <a:masterClrMapping/>
+  </p:clrMapOvr>
+</p:sld>
+</file>
+
 <file path=ppt/tags/tag1.xml><?xml version="1.0" encoding="utf-8"?>
 <p:tagLst xmlns:a="http://schemas.openxmlformats.org/drawingml/2006/main" xmlns:r="http://schemas.openxmlformats.org/officeDocument/2006/relationships" xmlns:p="http://schemas.openxmlformats.org/presentationml/2006/main">
   <p:tag name="MMPROD_NEXTUNIQUEID" val="10009"/>

</xml_diff>